<commit_message>
editted screenshots at end of presentation
</commit_message>
<xml_diff>
--- a/Project Specs/Final presentation.pptx
+++ b/Project Specs/Final presentation.pptx
@@ -3158,7 +3158,7 @@
     </p:spTree>
     <p:extLst>
       <p:ext uri="{BB962C8B-B14F-4D97-AF65-F5344CB8AC3E}">
-        <p14:creationId xmlns:p14="http://schemas.microsoft.com/office/powerpoint/2010/main" xmlns="" val="240978538"/>
+        <p14:creationId xmlns:p14="http://schemas.microsoft.com/office/powerpoint/2010/main" val="240978538"/>
       </p:ext>
     </p:extLst>
   </p:cSld>
@@ -3252,7 +3252,7 @@
           <a:blip r:embed="rId2" cstate="print">
             <a:extLst>
               <a:ext uri="{28A0092B-C50C-407E-A947-70E740481C1C}">
-                <a14:useLocalDpi xmlns:a14="http://schemas.microsoft.com/office/drawing/2010/main" xmlns="" val="0"/>
+                <a14:useLocalDpi xmlns:a14="http://schemas.microsoft.com/office/drawing/2010/main" val="0"/>
               </a:ext>
             </a:extLst>
           </a:blip>
@@ -3272,7 +3272,7 @@
           <a:noFill/>
           <a:extLst>
             <a:ext uri="{909E8E84-426E-40DD-AFC4-6F175D3DCCD1}">
-              <a14:hiddenFill xmlns:a14="http://schemas.microsoft.com/office/drawing/2010/main" xmlns="">
+              <a14:hiddenFill xmlns:a14="http://schemas.microsoft.com/office/drawing/2010/main">
                 <a:solidFill>
                   <a:srgbClr val="FFFFFF"/>
                 </a:solidFill>
@@ -3284,7 +3284,7 @@
     </p:spTree>
     <p:extLst>
       <p:ext uri="{BB962C8B-B14F-4D97-AF65-F5344CB8AC3E}">
-        <p14:creationId xmlns:p14="http://schemas.microsoft.com/office/powerpoint/2010/main" xmlns="" val="1343128696"/>
+        <p14:creationId xmlns:p14="http://schemas.microsoft.com/office/powerpoint/2010/main" val="1343128696"/>
       </p:ext>
     </p:extLst>
   </p:cSld>
@@ -3330,7 +3330,7 @@
           <a:blip r:embed="rId2" cstate="print">
             <a:extLst>
               <a:ext uri="{28A0092B-C50C-407E-A947-70E740481C1C}">
-                <a14:useLocalDpi xmlns:a14="http://schemas.microsoft.com/office/drawing/2010/main" xmlns="" val="0"/>
+                <a14:useLocalDpi xmlns:a14="http://schemas.microsoft.com/office/drawing/2010/main" val="0"/>
               </a:ext>
             </a:extLst>
           </a:blip>
@@ -3350,7 +3350,7 @@
           <a:noFill/>
           <a:extLst>
             <a:ext uri="{909E8E84-426E-40DD-AFC4-6F175D3DCCD1}">
-              <a14:hiddenFill xmlns:a14="http://schemas.microsoft.com/office/drawing/2010/main" xmlns="">
+              <a14:hiddenFill xmlns:a14="http://schemas.microsoft.com/office/drawing/2010/main">
                 <a:solidFill>
                   <a:srgbClr val="FFFFFF"/>
                 </a:solidFill>
@@ -3362,7 +3362,7 @@
     </p:spTree>
     <p:extLst>
       <p:ext uri="{BB962C8B-B14F-4D97-AF65-F5344CB8AC3E}">
-        <p14:creationId xmlns:p14="http://schemas.microsoft.com/office/powerpoint/2010/main" xmlns="" val="2224659091"/>
+        <p14:creationId xmlns:p14="http://schemas.microsoft.com/office/powerpoint/2010/main" val="2224659091"/>
       </p:ext>
     </p:extLst>
   </p:cSld>
@@ -3408,7 +3408,7 @@
           <a:blip r:embed="rId2" cstate="print">
             <a:extLst>
               <a:ext uri="{28A0092B-C50C-407E-A947-70E740481C1C}">
-                <a14:useLocalDpi xmlns:a14="http://schemas.microsoft.com/office/drawing/2010/main" xmlns="" val="0"/>
+                <a14:useLocalDpi xmlns:a14="http://schemas.microsoft.com/office/drawing/2010/main" val="0"/>
               </a:ext>
             </a:extLst>
           </a:blip>
@@ -3428,7 +3428,7 @@
           <a:noFill/>
           <a:extLst>
             <a:ext uri="{909E8E84-426E-40DD-AFC4-6F175D3DCCD1}">
-              <a14:hiddenFill xmlns:a14="http://schemas.microsoft.com/office/drawing/2010/main" xmlns="">
+              <a14:hiddenFill xmlns:a14="http://schemas.microsoft.com/office/drawing/2010/main">
                 <a:solidFill>
                   <a:srgbClr val="FFFFFF"/>
                 </a:solidFill>
@@ -3440,7 +3440,7 @@
     </p:spTree>
     <p:extLst>
       <p:ext uri="{BB962C8B-B14F-4D97-AF65-F5344CB8AC3E}">
-        <p14:creationId xmlns:p14="http://schemas.microsoft.com/office/powerpoint/2010/main" xmlns="" val="2224659091"/>
+        <p14:creationId xmlns:p14="http://schemas.microsoft.com/office/powerpoint/2010/main" val="2224659091"/>
       </p:ext>
     </p:extLst>
   </p:cSld>
@@ -3486,7 +3486,7 @@
           <a:blip r:embed="rId2" cstate="print">
             <a:extLst>
               <a:ext uri="{28A0092B-C50C-407E-A947-70E740481C1C}">
-                <a14:useLocalDpi xmlns:a14="http://schemas.microsoft.com/office/drawing/2010/main" xmlns="" val="0"/>
+                <a14:useLocalDpi xmlns:a14="http://schemas.microsoft.com/office/drawing/2010/main" val="0"/>
               </a:ext>
             </a:extLst>
           </a:blip>
@@ -3506,7 +3506,7 @@
           <a:noFill/>
           <a:extLst>
             <a:ext uri="{909E8E84-426E-40DD-AFC4-6F175D3DCCD1}">
-              <a14:hiddenFill xmlns:a14="http://schemas.microsoft.com/office/drawing/2010/main" xmlns="">
+              <a14:hiddenFill xmlns:a14="http://schemas.microsoft.com/office/drawing/2010/main">
                 <a:solidFill>
                   <a:srgbClr val="FFFFFF"/>
                 </a:solidFill>
@@ -3518,7 +3518,7 @@
     </p:spTree>
     <p:extLst>
       <p:ext uri="{BB962C8B-B14F-4D97-AF65-F5344CB8AC3E}">
-        <p14:creationId xmlns:p14="http://schemas.microsoft.com/office/powerpoint/2010/main" xmlns="" val="2224659091"/>
+        <p14:creationId xmlns:p14="http://schemas.microsoft.com/office/powerpoint/2010/main" val="2224659091"/>
       </p:ext>
     </p:extLst>
   </p:cSld>
@@ -3564,7 +3564,7 @@
           <a:blip r:embed="rId2" cstate="print">
             <a:extLst>
               <a:ext uri="{28A0092B-C50C-407E-A947-70E740481C1C}">
-                <a14:useLocalDpi xmlns:a14="http://schemas.microsoft.com/office/drawing/2010/main" xmlns="" val="0"/>
+                <a14:useLocalDpi xmlns:a14="http://schemas.microsoft.com/office/drawing/2010/main" val="0"/>
               </a:ext>
             </a:extLst>
           </a:blip>
@@ -3584,7 +3584,7 @@
           <a:noFill/>
           <a:extLst>
             <a:ext uri="{909E8E84-426E-40DD-AFC4-6F175D3DCCD1}">
-              <a14:hiddenFill xmlns:a14="http://schemas.microsoft.com/office/drawing/2010/main" xmlns="">
+              <a14:hiddenFill xmlns:a14="http://schemas.microsoft.com/office/drawing/2010/main">
                 <a:solidFill>
                   <a:srgbClr val="FFFFFF"/>
                 </a:solidFill>
@@ -3596,7 +3596,7 @@
     </p:spTree>
     <p:extLst>
       <p:ext uri="{BB962C8B-B14F-4D97-AF65-F5344CB8AC3E}">
-        <p14:creationId xmlns:p14="http://schemas.microsoft.com/office/powerpoint/2010/main" xmlns="" val="2224659091"/>
+        <p14:creationId xmlns:p14="http://schemas.microsoft.com/office/powerpoint/2010/main" val="2224659091"/>
       </p:ext>
     </p:extLst>
   </p:cSld>
@@ -3642,7 +3642,7 @@
           <a:blip r:embed="rId2" cstate="print">
             <a:extLst>
               <a:ext uri="{28A0092B-C50C-407E-A947-70E740481C1C}">
-                <a14:useLocalDpi xmlns:a14="http://schemas.microsoft.com/office/drawing/2010/main" xmlns="" val="0"/>
+                <a14:useLocalDpi xmlns:a14="http://schemas.microsoft.com/office/drawing/2010/main" val="0"/>
               </a:ext>
             </a:extLst>
           </a:blip>
@@ -3662,7 +3662,7 @@
           <a:noFill/>
           <a:extLst>
             <a:ext uri="{909E8E84-426E-40DD-AFC4-6F175D3DCCD1}">
-              <a14:hiddenFill xmlns:a14="http://schemas.microsoft.com/office/drawing/2010/main" xmlns="">
+              <a14:hiddenFill xmlns:a14="http://schemas.microsoft.com/office/drawing/2010/main">
                 <a:solidFill>
                   <a:srgbClr val="FFFFFF"/>
                 </a:solidFill>
@@ -3674,7 +3674,7 @@
     </p:spTree>
     <p:extLst>
       <p:ext uri="{BB962C8B-B14F-4D97-AF65-F5344CB8AC3E}">
-        <p14:creationId xmlns:p14="http://schemas.microsoft.com/office/powerpoint/2010/main" xmlns="" val="2224659091"/>
+        <p14:creationId xmlns:p14="http://schemas.microsoft.com/office/powerpoint/2010/main" val="2224659091"/>
       </p:ext>
     </p:extLst>
   </p:cSld>
@@ -3720,7 +3720,7 @@
           <a:blip r:embed="rId2" cstate="print">
             <a:extLst>
               <a:ext uri="{28A0092B-C50C-407E-A947-70E740481C1C}">
-                <a14:useLocalDpi xmlns:a14="http://schemas.microsoft.com/office/drawing/2010/main" xmlns="" val="0"/>
+                <a14:useLocalDpi xmlns:a14="http://schemas.microsoft.com/office/drawing/2010/main" val="0"/>
               </a:ext>
             </a:extLst>
           </a:blip>
@@ -3740,7 +3740,7 @@
           <a:noFill/>
           <a:extLst>
             <a:ext uri="{909E8E84-426E-40DD-AFC4-6F175D3DCCD1}">
-              <a14:hiddenFill xmlns:a14="http://schemas.microsoft.com/office/drawing/2010/main" xmlns="">
+              <a14:hiddenFill xmlns:a14="http://schemas.microsoft.com/office/drawing/2010/main">
                 <a:solidFill>
                   <a:srgbClr val="FFFFFF"/>
                 </a:solidFill>
@@ -3752,7 +3752,7 @@
     </p:spTree>
     <p:extLst>
       <p:ext uri="{BB962C8B-B14F-4D97-AF65-F5344CB8AC3E}">
-        <p14:creationId xmlns:p14="http://schemas.microsoft.com/office/powerpoint/2010/main" xmlns="" val="2224659091"/>
+        <p14:creationId xmlns:p14="http://schemas.microsoft.com/office/powerpoint/2010/main" val="2224659091"/>
       </p:ext>
     </p:extLst>
   </p:cSld>
@@ -3798,7 +3798,7 @@
           <a:blip r:embed="rId2" cstate="print">
             <a:extLst>
               <a:ext uri="{28A0092B-C50C-407E-A947-70E740481C1C}">
-                <a14:useLocalDpi xmlns:a14="http://schemas.microsoft.com/office/drawing/2010/main" xmlns="" val="0"/>
+                <a14:useLocalDpi xmlns:a14="http://schemas.microsoft.com/office/drawing/2010/main" val="0"/>
               </a:ext>
             </a:extLst>
           </a:blip>
@@ -3818,7 +3818,7 @@
           <a:noFill/>
           <a:extLst>
             <a:ext uri="{909E8E84-426E-40DD-AFC4-6F175D3DCCD1}">
-              <a14:hiddenFill xmlns:a14="http://schemas.microsoft.com/office/drawing/2010/main" xmlns="">
+              <a14:hiddenFill xmlns:a14="http://schemas.microsoft.com/office/drawing/2010/main">
                 <a:solidFill>
                   <a:srgbClr val="FFFFFF"/>
                 </a:solidFill>
@@ -3830,7 +3830,7 @@
     </p:spTree>
     <p:extLst>
       <p:ext uri="{BB962C8B-B14F-4D97-AF65-F5344CB8AC3E}">
-        <p14:creationId xmlns:p14="http://schemas.microsoft.com/office/powerpoint/2010/main" xmlns="" val="2224659091"/>
+        <p14:creationId xmlns:p14="http://schemas.microsoft.com/office/powerpoint/2010/main" val="2224659091"/>
       </p:ext>
     </p:extLst>
   </p:cSld>
@@ -3876,7 +3876,7 @@
           <a:blip r:embed="rId2" cstate="print">
             <a:extLst>
               <a:ext uri="{28A0092B-C50C-407E-A947-70E740481C1C}">
-                <a14:useLocalDpi xmlns:a14="http://schemas.microsoft.com/office/drawing/2010/main" xmlns="" val="0"/>
+                <a14:useLocalDpi xmlns:a14="http://schemas.microsoft.com/office/drawing/2010/main" val="0"/>
               </a:ext>
             </a:extLst>
           </a:blip>
@@ -3896,7 +3896,7 @@
           <a:noFill/>
           <a:extLst>
             <a:ext uri="{909E8E84-426E-40DD-AFC4-6F175D3DCCD1}">
-              <a14:hiddenFill xmlns:a14="http://schemas.microsoft.com/office/drawing/2010/main" xmlns="">
+              <a14:hiddenFill xmlns:a14="http://schemas.microsoft.com/office/drawing/2010/main">
                 <a:solidFill>
                   <a:srgbClr val="FFFFFF"/>
                 </a:solidFill>
@@ -3908,7 +3908,7 @@
     </p:spTree>
     <p:extLst>
       <p:ext uri="{BB962C8B-B14F-4D97-AF65-F5344CB8AC3E}">
-        <p14:creationId xmlns:p14="http://schemas.microsoft.com/office/powerpoint/2010/main" xmlns="" val="2224659091"/>
+        <p14:creationId xmlns:p14="http://schemas.microsoft.com/office/powerpoint/2010/main" val="2224659091"/>
       </p:ext>
     </p:extLst>
   </p:cSld>
@@ -4007,7 +4007,7 @@
           <a:blip r:embed="rId2" cstate="print">
             <a:extLst>
               <a:ext uri="{28A0092B-C50C-407E-A947-70E740481C1C}">
-                <a14:useLocalDpi xmlns:a14="http://schemas.microsoft.com/office/drawing/2010/main" xmlns="" val="0"/>
+                <a14:useLocalDpi xmlns:a14="http://schemas.microsoft.com/office/drawing/2010/main" val="0"/>
               </a:ext>
             </a:extLst>
           </a:blip>
@@ -4027,7 +4027,7 @@
           <a:noFill/>
           <a:extLst>
             <a:ext uri="{909E8E84-426E-40DD-AFC4-6F175D3DCCD1}">
-              <a14:hiddenFill xmlns:a14="http://schemas.microsoft.com/office/drawing/2010/main" xmlns="">
+              <a14:hiddenFill xmlns:a14="http://schemas.microsoft.com/office/drawing/2010/main">
                 <a:solidFill>
                   <a:srgbClr val="FFFFFF"/>
                 </a:solidFill>
@@ -4048,7 +4048,7 @@
           <a:blip r:embed="rId3" cstate="print">
             <a:extLst>
               <a:ext uri="{28A0092B-C50C-407E-A947-70E740481C1C}">
-                <a14:useLocalDpi xmlns:a14="http://schemas.microsoft.com/office/drawing/2010/main" xmlns="" val="0"/>
+                <a14:useLocalDpi xmlns:a14="http://schemas.microsoft.com/office/drawing/2010/main" val="0"/>
               </a:ext>
             </a:extLst>
           </a:blip>
@@ -4068,7 +4068,7 @@
           <a:noFill/>
           <a:extLst>
             <a:ext uri="{909E8E84-426E-40DD-AFC4-6F175D3DCCD1}">
-              <a14:hiddenFill xmlns:a14="http://schemas.microsoft.com/office/drawing/2010/main" xmlns="">
+              <a14:hiddenFill xmlns:a14="http://schemas.microsoft.com/office/drawing/2010/main">
                 <a:solidFill>
                   <a:srgbClr val="FFFFFF"/>
                 </a:solidFill>
@@ -4080,7 +4080,7 @@
     </p:spTree>
     <p:extLst>
       <p:ext uri="{BB962C8B-B14F-4D97-AF65-F5344CB8AC3E}">
-        <p14:creationId xmlns:p14="http://schemas.microsoft.com/office/powerpoint/2010/main" xmlns="" val="740833071"/>
+        <p14:creationId xmlns:p14="http://schemas.microsoft.com/office/powerpoint/2010/main" val="740833071"/>
       </p:ext>
     </p:extLst>
   </p:cSld>
@@ -4126,7 +4126,7 @@
           <a:blip r:embed="rId2" cstate="print">
             <a:extLst>
               <a:ext uri="{28A0092B-C50C-407E-A947-70E740481C1C}">
-                <a14:useLocalDpi xmlns:a14="http://schemas.microsoft.com/office/drawing/2010/main" xmlns="" val="0"/>
+                <a14:useLocalDpi xmlns:a14="http://schemas.microsoft.com/office/drawing/2010/main" val="0"/>
               </a:ext>
             </a:extLst>
           </a:blip>
@@ -4146,7 +4146,7 @@
           <a:noFill/>
           <a:extLst>
             <a:ext uri="{909E8E84-426E-40DD-AFC4-6F175D3DCCD1}">
-              <a14:hiddenFill xmlns:a14="http://schemas.microsoft.com/office/drawing/2010/main" xmlns="">
+              <a14:hiddenFill xmlns:a14="http://schemas.microsoft.com/office/drawing/2010/main">
                 <a:solidFill>
                   <a:srgbClr val="FFFFFF"/>
                 </a:solidFill>
@@ -4158,7 +4158,7 @@
     </p:spTree>
     <p:extLst>
       <p:ext uri="{BB962C8B-B14F-4D97-AF65-F5344CB8AC3E}">
-        <p14:creationId xmlns:p14="http://schemas.microsoft.com/office/powerpoint/2010/main" xmlns="" val="2224659091"/>
+        <p14:creationId xmlns:p14="http://schemas.microsoft.com/office/powerpoint/2010/main" val="2224659091"/>
       </p:ext>
     </p:extLst>
   </p:cSld>
@@ -4204,7 +4204,7 @@
           <a:blip r:embed="rId2" cstate="print">
             <a:extLst>
               <a:ext uri="{28A0092B-C50C-407E-A947-70E740481C1C}">
-                <a14:useLocalDpi xmlns:a14="http://schemas.microsoft.com/office/drawing/2010/main" xmlns="" val="0"/>
+                <a14:useLocalDpi xmlns:a14="http://schemas.microsoft.com/office/drawing/2010/main" val="0"/>
               </a:ext>
             </a:extLst>
           </a:blip>
@@ -4224,7 +4224,7 @@
           <a:noFill/>
           <a:extLst>
             <a:ext uri="{909E8E84-426E-40DD-AFC4-6F175D3DCCD1}">
-              <a14:hiddenFill xmlns:a14="http://schemas.microsoft.com/office/drawing/2010/main" xmlns="">
+              <a14:hiddenFill xmlns:a14="http://schemas.microsoft.com/office/drawing/2010/main">
                 <a:solidFill>
                   <a:srgbClr val="FFFFFF"/>
                 </a:solidFill>
@@ -4236,7 +4236,7 @@
     </p:spTree>
     <p:extLst>
       <p:ext uri="{BB962C8B-B14F-4D97-AF65-F5344CB8AC3E}">
-        <p14:creationId xmlns:p14="http://schemas.microsoft.com/office/powerpoint/2010/main" xmlns="" val="2224659091"/>
+        <p14:creationId xmlns:p14="http://schemas.microsoft.com/office/powerpoint/2010/main" val="2224659091"/>
       </p:ext>
     </p:extLst>
   </p:cSld>
@@ -4282,7 +4282,7 @@
           <a:blip r:embed="rId2" cstate="print">
             <a:extLst>
               <a:ext uri="{28A0092B-C50C-407E-A947-70E740481C1C}">
-                <a14:useLocalDpi xmlns:a14="http://schemas.microsoft.com/office/drawing/2010/main" xmlns="" val="0"/>
+                <a14:useLocalDpi xmlns:a14="http://schemas.microsoft.com/office/drawing/2010/main" val="0"/>
               </a:ext>
             </a:extLst>
           </a:blip>
@@ -4302,7 +4302,7 @@
           <a:noFill/>
           <a:extLst>
             <a:ext uri="{909E8E84-426E-40DD-AFC4-6F175D3DCCD1}">
-              <a14:hiddenFill xmlns:a14="http://schemas.microsoft.com/office/drawing/2010/main" xmlns="">
+              <a14:hiddenFill xmlns:a14="http://schemas.microsoft.com/office/drawing/2010/main">
                 <a:solidFill>
                   <a:srgbClr val="FFFFFF"/>
                 </a:solidFill>
@@ -4314,7 +4314,7 @@
     </p:spTree>
     <p:extLst>
       <p:ext uri="{BB962C8B-B14F-4D97-AF65-F5344CB8AC3E}">
-        <p14:creationId xmlns:p14="http://schemas.microsoft.com/office/powerpoint/2010/main" xmlns="" val="2224659091"/>
+        <p14:creationId xmlns:p14="http://schemas.microsoft.com/office/powerpoint/2010/main" val="2224659091"/>
       </p:ext>
     </p:extLst>
   </p:cSld>
@@ -4360,7 +4360,7 @@
           <a:blip r:embed="rId2" cstate="print">
             <a:extLst>
               <a:ext uri="{28A0092B-C50C-407E-A947-70E740481C1C}">
-                <a14:useLocalDpi xmlns:a14="http://schemas.microsoft.com/office/drawing/2010/main" xmlns="" val="0"/>
+                <a14:useLocalDpi xmlns:a14="http://schemas.microsoft.com/office/drawing/2010/main" val="0"/>
               </a:ext>
             </a:extLst>
           </a:blip>
@@ -4380,7 +4380,7 @@
           <a:noFill/>
           <a:extLst>
             <a:ext uri="{909E8E84-426E-40DD-AFC4-6F175D3DCCD1}">
-              <a14:hiddenFill xmlns:a14="http://schemas.microsoft.com/office/drawing/2010/main" xmlns="">
+              <a14:hiddenFill xmlns:a14="http://schemas.microsoft.com/office/drawing/2010/main">
                 <a:solidFill>
                   <a:srgbClr val="FFFFFF"/>
                 </a:solidFill>
@@ -4392,7 +4392,7 @@
     </p:spTree>
     <p:extLst>
       <p:ext uri="{BB962C8B-B14F-4D97-AF65-F5344CB8AC3E}">
-        <p14:creationId xmlns:p14="http://schemas.microsoft.com/office/powerpoint/2010/main" xmlns="" val="2224659091"/>
+        <p14:creationId xmlns:p14="http://schemas.microsoft.com/office/powerpoint/2010/main" val="2224659091"/>
       </p:ext>
     </p:extLst>
   </p:cSld>
@@ -4428,25 +4428,43 @@
       </p:grpSpPr>
       <p:pic>
         <p:nvPicPr>
-          <p:cNvPr id="4" name="Content Placeholder 3" descr="1.png"/>
+          <p:cNvPr id="1026" name="Picture 2" descr="C:\Users\MaxL\Desktop\Screenshots\Screenshot_2014-10-29-08-45-06.png"/>
           <p:cNvPicPr>
-            <a:picLocks noGrp="1" noChangeAspect="1"/>
+            <a:picLocks noChangeAspect="1" noChangeArrowheads="1"/>
           </p:cNvPicPr>
-          <p:nvPr>
-            <p:ph idx="1"/>
-          </p:nvPr>
+          <p:nvPr/>
         </p:nvPicPr>
         <p:blipFill>
-          <a:blip r:embed="rId2" cstate="print"/>
+          <a:blip r:embed="rId2">
+            <a:extLst>
+              <a:ext uri="{28A0092B-C50C-407E-A947-70E740481C1C}">
+                <a14:useLocalDpi xmlns:a14="http://schemas.microsoft.com/office/drawing/2010/main" val="0"/>
+              </a:ext>
+            </a:extLst>
+          </a:blip>
+          <a:srcRect/>
           <a:stretch>
             <a:fillRect/>
           </a:stretch>
         </p:blipFill>
-        <p:spPr>
+        <p:spPr bwMode="auto">
           <a:xfrm>
-            <a:off x="762000" y="381000"/>
-            <a:ext cx="7620000" cy="5715000"/>
+            <a:off x="0" y="818674"/>
+            <a:ext cx="9110978" cy="5124926"/>
           </a:xfrm>
+          <a:prstGeom prst="rect">
+            <a:avLst/>
+          </a:prstGeom>
+          <a:noFill/>
+          <a:extLst>
+            <a:ext uri="{909E8E84-426E-40DD-AFC4-6F175D3DCCD1}">
+              <a14:hiddenFill xmlns:a14="http://schemas.microsoft.com/office/drawing/2010/main">
+                <a:solidFill>
+                  <a:srgbClr val="FFFFFF"/>
+                </a:solidFill>
+              </a14:hiddenFill>
+            </a:ext>
+          </a:extLst>
         </p:spPr>
       </p:pic>
     </p:spTree>
@@ -4454,6 +4472,13 @@
   <p:clrMapOvr>
     <a:masterClrMapping/>
   </p:clrMapOvr>
+  <p:timing>
+    <p:tnLst>
+      <p:par>
+        <p:cTn id="1" dur="indefinite" restart="never" nodeType="tmRoot"/>
+      </p:par>
+    </p:tnLst>
+  </p:timing>
 </p:sld>
 </file>
 
@@ -4476,25 +4501,43 @@
       </p:grpSpPr>
       <p:pic>
         <p:nvPicPr>
-          <p:cNvPr id="4" name="Content Placeholder 3" descr="2.png"/>
+          <p:cNvPr id="2050" name="Picture 2" descr="C:\Users\MaxL\Desktop\Screenshots\Screenshot_2014-10-29-08-49-01.png"/>
           <p:cNvPicPr>
-            <a:picLocks noGrp="1" noChangeAspect="1"/>
+            <a:picLocks noChangeAspect="1" noChangeArrowheads="1"/>
           </p:cNvPicPr>
-          <p:nvPr>
-            <p:ph idx="1"/>
-          </p:nvPr>
+          <p:nvPr/>
         </p:nvPicPr>
         <p:blipFill>
-          <a:blip r:embed="rId2" cstate="print"/>
+          <a:blip r:embed="rId2">
+            <a:extLst>
+              <a:ext uri="{28A0092B-C50C-407E-A947-70E740481C1C}">
+                <a14:useLocalDpi xmlns:a14="http://schemas.microsoft.com/office/drawing/2010/main" val="0"/>
+              </a:ext>
+            </a:extLst>
+          </a:blip>
+          <a:srcRect/>
           <a:stretch>
             <a:fillRect/>
           </a:stretch>
         </p:blipFill>
-        <p:spPr>
+        <p:spPr bwMode="auto">
           <a:xfrm>
-            <a:off x="762000" y="457200"/>
-            <a:ext cx="7620000" cy="5783262"/>
+            <a:off x="0" y="762000"/>
+            <a:ext cx="9076266" cy="5105400"/>
           </a:xfrm>
+          <a:prstGeom prst="rect">
+            <a:avLst/>
+          </a:prstGeom>
+          <a:noFill/>
+          <a:extLst>
+            <a:ext uri="{909E8E84-426E-40DD-AFC4-6F175D3DCCD1}">
+              <a14:hiddenFill xmlns:a14="http://schemas.microsoft.com/office/drawing/2010/main">
+                <a:solidFill>
+                  <a:srgbClr val="FFFFFF"/>
+                </a:solidFill>
+              </a14:hiddenFill>
+            </a:ext>
+          </a:extLst>
         </p:spPr>
       </p:pic>
     </p:spTree>
@@ -4502,6 +4545,13 @@
   <p:clrMapOvr>
     <a:masterClrMapping/>
   </p:clrMapOvr>
+  <p:timing>
+    <p:tnLst>
+      <p:par>
+        <p:cTn id="1" dur="indefinite" restart="never" nodeType="tmRoot"/>
+      </p:par>
+    </p:tnLst>
+  </p:timing>
 </p:sld>
 </file>
 
@@ -4524,25 +4574,43 @@
       </p:grpSpPr>
       <p:pic>
         <p:nvPicPr>
-          <p:cNvPr id="4" name="Content Placeholder 3" descr="3.png"/>
+          <p:cNvPr id="3074" name="Picture 2" descr="C:\Users\MaxL\Desktop\Screenshots\Screenshot_2014-10-29-08-49-45.png"/>
           <p:cNvPicPr>
-            <a:picLocks noGrp="1" noChangeAspect="1"/>
+            <a:picLocks noChangeAspect="1" noChangeArrowheads="1"/>
           </p:cNvPicPr>
-          <p:nvPr>
-            <p:ph idx="1"/>
-          </p:nvPr>
+          <p:nvPr/>
         </p:nvPicPr>
         <p:blipFill>
-          <a:blip r:embed="rId2" cstate="print"/>
+          <a:blip r:embed="rId2">
+            <a:extLst>
+              <a:ext uri="{28A0092B-C50C-407E-A947-70E740481C1C}">
+                <a14:useLocalDpi xmlns:a14="http://schemas.microsoft.com/office/drawing/2010/main" val="0"/>
+              </a:ext>
+            </a:extLst>
+          </a:blip>
+          <a:srcRect/>
           <a:stretch>
             <a:fillRect/>
           </a:stretch>
         </p:blipFill>
-        <p:spPr>
+        <p:spPr bwMode="auto">
           <a:xfrm>
-            <a:off x="762000" y="381000"/>
-            <a:ext cx="7620000" cy="5638800"/>
+            <a:off x="15240" y="762000"/>
+            <a:ext cx="9128760" cy="5134927"/>
           </a:xfrm>
+          <a:prstGeom prst="rect">
+            <a:avLst/>
+          </a:prstGeom>
+          <a:noFill/>
+          <a:extLst>
+            <a:ext uri="{909E8E84-426E-40DD-AFC4-6F175D3DCCD1}">
+              <a14:hiddenFill xmlns:a14="http://schemas.microsoft.com/office/drawing/2010/main">
+                <a:solidFill>
+                  <a:srgbClr val="FFFFFF"/>
+                </a:solidFill>
+              </a14:hiddenFill>
+            </a:ext>
+          </a:extLst>
         </p:spPr>
       </p:pic>
     </p:spTree>
@@ -4550,6 +4618,13 @@
   <p:clrMapOvr>
     <a:masterClrMapping/>
   </p:clrMapOvr>
+  <p:timing>
+    <p:tnLst>
+      <p:par>
+        <p:cTn id="1" dur="indefinite" restart="never" nodeType="tmRoot"/>
+      </p:par>
+    </p:tnLst>
+  </p:timing>
 </p:sld>
 </file>
 
@@ -4572,25 +4647,43 @@
       </p:grpSpPr>
       <p:pic>
         <p:nvPicPr>
-          <p:cNvPr id="4" name="Content Placeholder 3" descr="4.png"/>
+          <p:cNvPr id="4098" name="Picture 2" descr="C:\Users\MaxL\Desktop\Screenshots\Screenshot_2014-10-29-08-50-09.png"/>
           <p:cNvPicPr>
-            <a:picLocks noGrp="1" noChangeAspect="1"/>
+            <a:picLocks noChangeAspect="1" noChangeArrowheads="1"/>
           </p:cNvPicPr>
-          <p:nvPr>
-            <p:ph idx="1"/>
-          </p:nvPr>
+          <p:nvPr/>
         </p:nvPicPr>
         <p:blipFill>
-          <a:blip r:embed="rId2" cstate="print"/>
+          <a:blip r:embed="rId2">
+            <a:extLst>
+              <a:ext uri="{28A0092B-C50C-407E-A947-70E740481C1C}">
+                <a14:useLocalDpi xmlns:a14="http://schemas.microsoft.com/office/drawing/2010/main" val="0"/>
+              </a:ext>
+            </a:extLst>
+          </a:blip>
+          <a:srcRect/>
           <a:stretch>
             <a:fillRect/>
           </a:stretch>
         </p:blipFill>
-        <p:spPr>
+        <p:spPr bwMode="auto">
           <a:xfrm>
-            <a:off x="762000" y="533400"/>
-            <a:ext cx="7620000" cy="5638800"/>
+            <a:off x="42335" y="685800"/>
+            <a:ext cx="9076265" cy="5105400"/>
           </a:xfrm>
+          <a:prstGeom prst="rect">
+            <a:avLst/>
+          </a:prstGeom>
+          <a:noFill/>
+          <a:extLst>
+            <a:ext uri="{909E8E84-426E-40DD-AFC4-6F175D3DCCD1}">
+              <a14:hiddenFill xmlns:a14="http://schemas.microsoft.com/office/drawing/2010/main">
+                <a:solidFill>
+                  <a:srgbClr val="FFFFFF"/>
+                </a:solidFill>
+              </a14:hiddenFill>
+            </a:ext>
+          </a:extLst>
         </p:spPr>
       </p:pic>
     </p:spTree>
@@ -4598,6 +4691,13 @@
   <p:clrMapOvr>
     <a:masterClrMapping/>
   </p:clrMapOvr>
+  <p:timing>
+    <p:tnLst>
+      <p:par>
+        <p:cTn id="1" dur="indefinite" restart="never" nodeType="tmRoot"/>
+      </p:par>
+    </p:tnLst>
+  </p:timing>
 </p:sld>
 </file>
 
@@ -4730,7 +4830,7 @@
           <a:blip r:embed="rId2" cstate="print">
             <a:extLst>
               <a:ext uri="{28A0092B-C50C-407E-A947-70E740481C1C}">
-                <a14:useLocalDpi xmlns:a14="http://schemas.microsoft.com/office/drawing/2010/main" xmlns="" val="0"/>
+                <a14:useLocalDpi xmlns:a14="http://schemas.microsoft.com/office/drawing/2010/main" val="0"/>
               </a:ext>
             </a:extLst>
           </a:blip>
@@ -4751,7 +4851,7 @@
     </p:spTree>
     <p:extLst>
       <p:ext uri="{BB962C8B-B14F-4D97-AF65-F5344CB8AC3E}">
-        <p14:creationId xmlns:p14="http://schemas.microsoft.com/office/powerpoint/2010/main" xmlns="" val="4293038697"/>
+        <p14:creationId xmlns:p14="http://schemas.microsoft.com/office/powerpoint/2010/main" val="4293038697"/>
       </p:ext>
     </p:extLst>
   </p:cSld>
@@ -4898,7 +4998,7 @@
     </p:spTree>
     <p:extLst>
       <p:ext uri="{BB962C8B-B14F-4D97-AF65-F5344CB8AC3E}">
-        <p14:creationId xmlns:p14="http://schemas.microsoft.com/office/powerpoint/2010/main" xmlns="" val="2278892808"/>
+        <p14:creationId xmlns:p14="http://schemas.microsoft.com/office/powerpoint/2010/main" val="2278892808"/>
       </p:ext>
     </p:extLst>
   </p:cSld>
@@ -4977,7 +5077,7 @@
           <a:blip r:embed="rId2" cstate="print">
             <a:extLst>
               <a:ext uri="{28A0092B-C50C-407E-A947-70E740481C1C}">
-                <a14:useLocalDpi xmlns:a14="http://schemas.microsoft.com/office/drawing/2010/main" xmlns="" val="0"/>
+                <a14:useLocalDpi xmlns:a14="http://schemas.microsoft.com/office/drawing/2010/main" val="0"/>
               </a:ext>
             </a:extLst>
           </a:blip>
@@ -5007,7 +5107,7 @@
           <a:blip r:embed="rId3" cstate="print">
             <a:extLst>
               <a:ext uri="{28A0092B-C50C-407E-A947-70E740481C1C}">
-                <a14:useLocalDpi xmlns:a14="http://schemas.microsoft.com/office/drawing/2010/main" xmlns="" val="0"/>
+                <a14:useLocalDpi xmlns:a14="http://schemas.microsoft.com/office/drawing/2010/main" val="0"/>
               </a:ext>
             </a:extLst>
           </a:blip>
@@ -5028,7 +5128,7 @@
     </p:spTree>
     <p:extLst>
       <p:ext uri="{BB962C8B-B14F-4D97-AF65-F5344CB8AC3E}">
-        <p14:creationId xmlns:p14="http://schemas.microsoft.com/office/powerpoint/2010/main" xmlns="" val="829165369"/>
+        <p14:creationId xmlns:p14="http://schemas.microsoft.com/office/powerpoint/2010/main" val="829165369"/>
       </p:ext>
     </p:extLst>
   </p:cSld>
@@ -5165,7 +5265,7 @@
           <a:blip r:embed="rId2" cstate="print">
             <a:extLst>
               <a:ext uri="{28A0092B-C50C-407E-A947-70E740481C1C}">
-                <a14:useLocalDpi xmlns:a14="http://schemas.microsoft.com/office/drawing/2010/main" xmlns="" val="0"/>
+                <a14:useLocalDpi xmlns:a14="http://schemas.microsoft.com/office/drawing/2010/main" val="0"/>
               </a:ext>
             </a:extLst>
           </a:blip>
@@ -5185,7 +5285,7 @@
           <a:noFill/>
           <a:extLst>
             <a:ext uri="{909E8E84-426E-40DD-AFC4-6F175D3DCCD1}">
-              <a14:hiddenFill xmlns:a14="http://schemas.microsoft.com/office/drawing/2010/main" xmlns="">
+              <a14:hiddenFill xmlns:a14="http://schemas.microsoft.com/office/drawing/2010/main">
                 <a:solidFill>
                   <a:srgbClr val="FFFFFF"/>
                 </a:solidFill>
@@ -5206,7 +5306,7 @@
           <a:blip r:embed="rId3" cstate="print">
             <a:extLst>
               <a:ext uri="{28A0092B-C50C-407E-A947-70E740481C1C}">
-                <a14:useLocalDpi xmlns:a14="http://schemas.microsoft.com/office/drawing/2010/main" xmlns="" val="0"/>
+                <a14:useLocalDpi xmlns:a14="http://schemas.microsoft.com/office/drawing/2010/main" val="0"/>
               </a:ext>
             </a:extLst>
           </a:blip>
@@ -5226,7 +5326,7 @@
           <a:noFill/>
           <a:extLst>
             <a:ext uri="{909E8E84-426E-40DD-AFC4-6F175D3DCCD1}">
-              <a14:hiddenFill xmlns:a14="http://schemas.microsoft.com/office/drawing/2010/main" xmlns="">
+              <a14:hiddenFill xmlns:a14="http://schemas.microsoft.com/office/drawing/2010/main">
                 <a:solidFill>
                   <a:srgbClr val="FFFFFF"/>
                 </a:solidFill>
@@ -5238,7 +5338,7 @@
     </p:spTree>
     <p:extLst>
       <p:ext uri="{BB962C8B-B14F-4D97-AF65-F5344CB8AC3E}">
-        <p14:creationId xmlns:p14="http://schemas.microsoft.com/office/powerpoint/2010/main" xmlns="" val="1935748172"/>
+        <p14:creationId xmlns:p14="http://schemas.microsoft.com/office/powerpoint/2010/main" val="1935748172"/>
       </p:ext>
     </p:extLst>
   </p:cSld>
@@ -5394,7 +5494,7 @@
     </p:spTree>
     <p:extLst>
       <p:ext uri="{BB962C8B-B14F-4D97-AF65-F5344CB8AC3E}">
-        <p14:creationId xmlns:p14="http://schemas.microsoft.com/office/powerpoint/2010/main" xmlns="" val="648631741"/>
+        <p14:creationId xmlns:p14="http://schemas.microsoft.com/office/powerpoint/2010/main" val="648631741"/>
       </p:ext>
     </p:extLst>
   </p:cSld>
@@ -5465,7 +5565,7 @@
           <a:blip r:embed="rId2" cstate="print">
             <a:extLst>
               <a:ext uri="{28A0092B-C50C-407E-A947-70E740481C1C}">
-                <a14:useLocalDpi xmlns:a14="http://schemas.microsoft.com/office/drawing/2010/main" xmlns="" val="0"/>
+                <a14:useLocalDpi xmlns:a14="http://schemas.microsoft.com/office/drawing/2010/main" val="0"/>
               </a:ext>
             </a:extLst>
           </a:blip>
@@ -5492,7 +5592,7 @@
           <a:blip r:embed="rId3" cstate="print">
             <a:extLst>
               <a:ext uri="{28A0092B-C50C-407E-A947-70E740481C1C}">
-                <a14:useLocalDpi xmlns:a14="http://schemas.microsoft.com/office/drawing/2010/main" xmlns="" val="0"/>
+                <a14:useLocalDpi xmlns:a14="http://schemas.microsoft.com/office/drawing/2010/main" val="0"/>
               </a:ext>
             </a:extLst>
           </a:blip>
@@ -5513,7 +5613,7 @@
     </p:spTree>
     <p:extLst>
       <p:ext uri="{BB962C8B-B14F-4D97-AF65-F5344CB8AC3E}">
-        <p14:creationId xmlns:p14="http://schemas.microsoft.com/office/powerpoint/2010/main" xmlns="" val="958936446"/>
+        <p14:creationId xmlns:p14="http://schemas.microsoft.com/office/powerpoint/2010/main" val="958936446"/>
       </p:ext>
     </p:extLst>
   </p:cSld>
@@ -5601,11 +5701,7 @@
           <a:p>
             <a:r>
               <a:rPr lang="en-US" dirty="0" smtClean="0"/>
-              <a:t>Custom </a:t>
-            </a:r>
-            <a:r>
-              <a:rPr lang="en-US" dirty="0" smtClean="0"/>
-              <a:t>Widgets</a:t>
+              <a:t>Custom Widgets</a:t>
             </a:r>
           </a:p>
           <a:p>
@@ -5613,7 +5709,6 @@
               <a:rPr lang="en-US" dirty="0" smtClean="0"/>
               <a:t>Object Creation</a:t>
             </a:r>
-            <a:endParaRPr lang="en-US" dirty="0" smtClean="0"/>
           </a:p>
           <a:p>
             <a:pPr lvl="1"/>

</xml_diff>